<commit_message>
added md file for activity
</commit_message>
<xml_diff>
--- a/Slides/Module 01.2 Requirements Gathering.pptx
+++ b/Slides/Module 01.2 Requirements Gathering.pptx
@@ -5170,6 +5170,20 @@
           <a:bodyPr/>
           <a:lstStyle/>
           <a:p>
+            <a:r>
+              <a:rPr lang="en-US" sz="1200" b="0" i="0" u="none" strike="noStrike" kern="1200" dirty="0">
+                <a:solidFill>
+                  <a:schemeClr val="tx1"/>
+                </a:solidFill>
+                <a:effectLst/>
+                <a:latin typeface="+mn-lt"/>
+                <a:ea typeface="+mn-ea"/>
+                <a:cs typeface="+mn-cs"/>
+              </a:rPr>
+              <a:t>Idea for Activity:</a:t>
+            </a:r>
+          </a:p>
+          <a:p>
             <a:endParaRPr lang="en-US" sz="1200" b="0" i="0" u="none" strike="noStrike" kern="1200" dirty="0">
               <a:solidFill>
                 <a:schemeClr val="tx1"/>
@@ -5179,6 +5193,20 @@
               <a:ea typeface="+mn-ea"/>
               <a:cs typeface="+mn-cs"/>
             </a:endParaRPr>
+          </a:p>
+          <a:p>
+            <a:r>
+              <a:rPr lang="en-US" sz="1200" b="0" i="0" u="none" strike="noStrike" kern="1200" dirty="0">
+                <a:solidFill>
+                  <a:schemeClr val="tx1"/>
+                </a:solidFill>
+                <a:effectLst/>
+                <a:latin typeface="+mn-lt"/>
+                <a:ea typeface="+mn-ea"/>
+                <a:cs typeface="+mn-cs"/>
+              </a:rPr>
+              <a:t>Allow students to provide examples of good and bad user stories and conditions of satisfaction. Have them discuss those and possibly present those.</a:t>
+            </a:r>
           </a:p>
         </p:txBody>
       </p:sp>
@@ -13388,7 +13416,7 @@
           <a:p>
             <a:r>
               <a:rPr lang="en-US" dirty="0"/>
-              <a:t>Lesson 1.2 Activity: user Stories</a:t>
+              <a:t>Lesson 1.2 Activity: User Stories</a:t>
             </a:r>
           </a:p>
         </p:txBody>

</xml_diff>

<commit_message>
M01.2, M02 small tweaks
</commit_message>
<xml_diff>
--- a/Slides/Module 01.2 Requirements Gathering.pptx
+++ b/Slides/Module 01.2 Requirements Gathering.pptx
@@ -22,9 +22,9 @@
     <p:sldId id="495" r:id="rId13"/>
     <p:sldId id="528" r:id="rId14"/>
     <p:sldId id="527" r:id="rId15"/>
-    <p:sldId id="529" r:id="rId16"/>
-    <p:sldId id="405" r:id="rId17"/>
-    <p:sldId id="497" r:id="rId18"/>
+    <p:sldId id="497" r:id="rId16"/>
+    <p:sldId id="529" r:id="rId17"/>
+    <p:sldId id="405" r:id="rId18"/>
     <p:sldId id="498" r:id="rId19"/>
     <p:sldId id="355" r:id="rId20"/>
   </p:sldIdLst>
@@ -165,9 +165,9 @@
             <p14:sldId id="495"/>
             <p14:sldId id="528"/>
             <p14:sldId id="527"/>
+            <p14:sldId id="497"/>
             <p14:sldId id="529"/>
             <p14:sldId id="405"/>
-            <p14:sldId id="497"/>
             <p14:sldId id="498"/>
             <p14:sldId id="355"/>
           </p14:sldIdLst>
@@ -3669,7 +3669,7 @@
           <a:p>
             <a:fld id="{7C7E5181-6CF5-45F7-A87A-E0E0B1FD7549}" type="datetimeFigureOut">
               <a:rPr lang="en-US" smtClean="0"/>
-              <a:t>12/25/2022</a:t>
+              <a:t>1/11/2023</a:t>
             </a:fld>
             <a:endParaRPr lang="en-US"/>
           </a:p>
@@ -4083,6 +4083,49 @@
             </a:pPr>
             <a:r>
               <a:rPr lang="en-US" dirty="0"/>
+              <a:t>There are many ways to document the requirements for a project.</a:t>
+            </a:r>
+          </a:p>
+          <a:p>
+            <a:pPr marL="0" marR="0" lvl="0" indent="0" algn="l" defTabSz="914400" rtl="0" eaLnBrk="1" fontAlgn="auto" latinLnBrk="0" hangingPunct="1">
+              <a:lnSpc>
+                <a:spcPct val="100000"/>
+              </a:lnSpc>
+              <a:spcBef>
+                <a:spcPts val="0"/>
+              </a:spcBef>
+              <a:spcAft>
+                <a:spcPts val="0"/>
+              </a:spcAft>
+              <a:buClrTx/>
+              <a:buSzTx/>
+              <a:buFontTx/>
+              <a:buNone/>
+              <a:tabLst/>
+              <a:defRPr/>
+            </a:pPr>
+            <a:endParaRPr lang="en-US" dirty="0"/>
+          </a:p>
+          <a:p>
+            <a:pPr marL="0" marR="0" lvl="0" indent="0" algn="l" defTabSz="914400" rtl="0" eaLnBrk="1" fontAlgn="auto" latinLnBrk="0" hangingPunct="1">
+              <a:lnSpc>
+                <a:spcPct val="100000"/>
+              </a:lnSpc>
+              <a:spcBef>
+                <a:spcPts val="0"/>
+              </a:spcBef>
+              <a:spcAft>
+                <a:spcPts val="0"/>
+              </a:spcAft>
+              <a:buClrTx/>
+              <a:buSzTx/>
+              <a:buFontTx/>
+              <a:buNone/>
+              <a:tabLst/>
+              <a:defRPr/>
+            </a:pPr>
+            <a:r>
+              <a:rPr lang="en-US" dirty="0"/>
               <a:t>One way to specify requirements is with a formal specification. That is, you specify all possible inputs and all expected outputs and side effects.</a:t>
             </a:r>
           </a:p>
@@ -4621,19 +4664,24 @@
           <a:bodyPr/>
           <a:lstStyle/>
           <a:p>
-            <a:r>
-              <a:rPr lang="en-US" dirty="0"/>
-              <a:t>User stories may be prioritized as Essential, Desirable or may just be for Extension.</a:t>
-            </a:r>
-          </a:p>
-          <a:p>
+            <a:pPr marL="0" marR="0" lvl="0" indent="0" algn="l" defTabSz="914400" rtl="0" eaLnBrk="1" fontAlgn="auto" latinLnBrk="0" hangingPunct="1">
+              <a:lnSpc>
+                <a:spcPct val="100000"/>
+              </a:lnSpc>
+              <a:spcBef>
+                <a:spcPts val="0"/>
+              </a:spcBef>
+              <a:spcAft>
+                <a:spcPts val="0"/>
+              </a:spcAft>
+              <a:buClrTx/>
+              <a:buSzTx/>
+              <a:buFontTx/>
+              <a:buNone/>
+              <a:tabLst/>
+              <a:defRPr/>
+            </a:pPr>
             <a:endParaRPr lang="en-US" dirty="0"/>
-          </a:p>
-          <a:p>
-            <a:r>
-              <a:rPr lang="en-US" dirty="0"/>
-              <a:t>All essential user stories often make Minimum Viable product</a:t>
-            </a:r>
           </a:p>
         </p:txBody>
       </p:sp>
@@ -4663,7 +4711,7 @@
     </p:spTree>
     <p:extLst>
       <p:ext uri="{BB962C8B-B14F-4D97-AF65-F5344CB8AC3E}">
-        <p14:creationId xmlns:p14="http://schemas.microsoft.com/office/powerpoint/2010/main" val="2864211945"/>
+        <p14:creationId xmlns:p14="http://schemas.microsoft.com/office/powerpoint/2010/main" val="346195192"/>
       </p:ext>
     </p:extLst>
   </p:cSld>
@@ -4717,187 +4765,18 @@
           <a:bodyPr/>
           <a:lstStyle/>
           <a:p>
-            <a:pPr marL="0" marR="0" lvl="0" indent="0" algn="l" defTabSz="914400" rtl="0" eaLnBrk="1" fontAlgn="auto" latinLnBrk="0" hangingPunct="1">
-              <a:lnSpc>
-                <a:spcPct val="100000"/>
-              </a:lnSpc>
-              <a:spcBef>
-                <a:spcPts val="0"/>
-              </a:spcBef>
-              <a:spcAft>
-                <a:spcPts val="0"/>
-              </a:spcAft>
-              <a:buClrTx/>
-              <a:buSzTx/>
-              <a:buFontTx/>
-              <a:buNone/>
-              <a:tabLst/>
-              <a:defRPr/>
-            </a:pPr>
-            <a:r>
-              <a:rPr lang="en-US" sz="3600" dirty="0"/>
-              <a:t>There are a number of important NF requirements to discuss. Here are some</a:t>
-            </a:r>
-          </a:p>
-          <a:p>
-            <a:pPr marL="0" marR="0" lvl="0" indent="0" algn="l" defTabSz="914400" rtl="0" eaLnBrk="1" fontAlgn="auto" latinLnBrk="0" hangingPunct="1">
-              <a:lnSpc>
-                <a:spcPct val="100000"/>
-              </a:lnSpc>
-              <a:spcBef>
-                <a:spcPts val="0"/>
-              </a:spcBef>
-              <a:spcAft>
-                <a:spcPts val="0"/>
-              </a:spcAft>
-              <a:buClrTx/>
-              <a:buSzTx/>
-              <a:buFontTx/>
-              <a:buNone/>
-              <a:tabLst/>
-              <a:defRPr/>
-            </a:pPr>
-            <a:r>
-              <a:rPr lang="en-US" sz="3600" dirty="0"/>
-              <a:t>Security — Does your product store or transmit sensitive information? Does your IT department require adherence to specific standards? What security best practices are used in your industry?</a:t>
-            </a:r>
-          </a:p>
-          <a:p>
-            <a:pPr marL="0" marR="0" lvl="0" indent="0" algn="l" defTabSz="914400" rtl="0" eaLnBrk="1" fontAlgn="auto" latinLnBrk="0" hangingPunct="1">
-              <a:lnSpc>
-                <a:spcPct val="100000"/>
-              </a:lnSpc>
-              <a:spcBef>
-                <a:spcPts val="0"/>
-              </a:spcBef>
-              <a:spcAft>
-                <a:spcPts val="0"/>
-              </a:spcAft>
-              <a:buClrTx/>
-              <a:buSzTx/>
-              <a:buFontTx/>
-              <a:buNone/>
-              <a:tabLst/>
-              <a:defRPr/>
-            </a:pPr>
-            <a:r>
-              <a:rPr lang="en-US" sz="3600" dirty="0"/>
-              <a:t>Capacity — What are your system’s storage requirements, today and in the future? How will your system scale up for increasing volume demands?</a:t>
-            </a:r>
-          </a:p>
-          <a:p>
-            <a:pPr marL="0" marR="0" lvl="0" indent="0" algn="l" defTabSz="914400" rtl="0" eaLnBrk="1" fontAlgn="auto" latinLnBrk="0" hangingPunct="1">
-              <a:lnSpc>
-                <a:spcPct val="100000"/>
-              </a:lnSpc>
-              <a:spcBef>
-                <a:spcPts val="0"/>
-              </a:spcBef>
-              <a:spcAft>
-                <a:spcPts val="0"/>
-              </a:spcAft>
-              <a:buClrTx/>
-              <a:buSzTx/>
-              <a:buFontTx/>
-              <a:buNone/>
-              <a:tabLst/>
-              <a:defRPr/>
-            </a:pPr>
-            <a:r>
-              <a:rPr lang="en-US" sz="3600" dirty="0"/>
-              <a:t>Compatibility — What are the minimum hardware requirements? What operating systems and their versions must be supported?</a:t>
-            </a:r>
-          </a:p>
-          <a:p>
-            <a:pPr marL="0" marR="0" lvl="0" indent="0" algn="l" defTabSz="914400" rtl="0" eaLnBrk="1" fontAlgn="auto" latinLnBrk="0" hangingPunct="1">
-              <a:lnSpc>
-                <a:spcPct val="100000"/>
-              </a:lnSpc>
-              <a:spcBef>
-                <a:spcPts val="0"/>
-              </a:spcBef>
-              <a:spcAft>
-                <a:spcPts val="0"/>
-              </a:spcAft>
-              <a:buClrTx/>
-              <a:buSzTx/>
-              <a:buFontTx/>
-              <a:buNone/>
-              <a:tabLst/>
-              <a:defRPr/>
-            </a:pPr>
-            <a:r>
-              <a:rPr lang="en-US" sz="3600" dirty="0"/>
-              <a:t>Reliability and Availability — What is the critical failure time under normal usage? Does a user need access to this all hours of every day?</a:t>
-            </a:r>
-          </a:p>
-          <a:p>
-            <a:pPr marL="0" marR="0" lvl="0" indent="0" algn="l" defTabSz="914400" rtl="0" eaLnBrk="1" fontAlgn="auto" latinLnBrk="0" hangingPunct="1">
-              <a:lnSpc>
-                <a:spcPct val="100000"/>
-              </a:lnSpc>
-              <a:spcBef>
-                <a:spcPts val="0"/>
-              </a:spcBef>
-              <a:spcAft>
-                <a:spcPts val="0"/>
-              </a:spcAft>
-              <a:buClrTx/>
-              <a:buSzTx/>
-              <a:buFontTx/>
-              <a:buNone/>
-              <a:tabLst/>
-              <a:defRPr/>
-            </a:pPr>
-            <a:r>
-              <a:rPr lang="en-US" sz="3600" dirty="0"/>
-              <a:t>Maintainability  + Manageability—How much time does it take to fix components, and how easily can an administrator manage the system? Under this umbrella, you could also define Recoverability and Serviceability.</a:t>
-            </a:r>
-          </a:p>
-          <a:p>
-            <a:pPr marL="0" marR="0" lvl="0" indent="0" algn="l" defTabSz="914400" rtl="0" eaLnBrk="1" fontAlgn="auto" latinLnBrk="0" hangingPunct="1">
-              <a:lnSpc>
-                <a:spcPct val="100000"/>
-              </a:lnSpc>
-              <a:spcBef>
-                <a:spcPts val="0"/>
-              </a:spcBef>
-              <a:spcAft>
-                <a:spcPts val="0"/>
-              </a:spcAft>
-              <a:buClrTx/>
-              <a:buSzTx/>
-              <a:buFontTx/>
-              <a:buNone/>
-              <a:tabLst/>
-              <a:defRPr/>
-            </a:pPr>
-            <a:r>
-              <a:rPr lang="en-US" sz="3600" dirty="0"/>
-              <a:t>Scalability – The Black Friday test. What are the highest workloads under which the system will still perform as expected?</a:t>
-            </a:r>
-          </a:p>
-          <a:p>
-            <a:pPr marL="0" marR="0" lvl="0" indent="0" algn="l" defTabSz="914400" rtl="0" eaLnBrk="1" fontAlgn="auto" latinLnBrk="0" hangingPunct="1">
-              <a:lnSpc>
-                <a:spcPct val="100000"/>
-              </a:lnSpc>
-              <a:spcBef>
-                <a:spcPts val="0"/>
-              </a:spcBef>
-              <a:spcAft>
-                <a:spcPts val="0"/>
-              </a:spcAft>
-              <a:buClrTx/>
-              <a:buSzTx/>
-              <a:buFontTx/>
-              <a:buNone/>
-              <a:tabLst/>
-              <a:defRPr/>
-            </a:pPr>
-            <a:r>
-              <a:rPr lang="en-US" sz="3600" dirty="0"/>
-              <a:t>Usability — How easy is it to use the product? What defines the experience of using the product?</a:t>
+            <a:r>
+              <a:rPr lang="en-US" dirty="0"/>
+              <a:t>User stories may be prioritized as Essential, Desirable or may just be for Extension.</a:t>
+            </a:r>
+          </a:p>
+          <a:p>
+            <a:endParaRPr lang="en-US" dirty="0"/>
+          </a:p>
+          <a:p>
+            <a:r>
+              <a:rPr lang="en-US" dirty="0"/>
+              <a:t>All essential user stories often make Minimum Viable product</a:t>
             </a:r>
           </a:p>
         </p:txBody>
@@ -4928,7 +4807,7 @@
     </p:spTree>
     <p:extLst>
       <p:ext uri="{BB962C8B-B14F-4D97-AF65-F5344CB8AC3E}">
-        <p14:creationId xmlns:p14="http://schemas.microsoft.com/office/powerpoint/2010/main" val="3623387796"/>
+        <p14:creationId xmlns:p14="http://schemas.microsoft.com/office/powerpoint/2010/main" val="2864211945"/>
       </p:ext>
     </p:extLst>
   </p:cSld>
@@ -4999,7 +4878,171 @@
               <a:tabLst/>
               <a:defRPr/>
             </a:pPr>
-            <a:endParaRPr lang="en-US" dirty="0"/>
+            <a:r>
+              <a:rPr lang="en-US" sz="3600" dirty="0"/>
+              <a:t>There are a number of important NF requirements to discuss. Here are some</a:t>
+            </a:r>
+          </a:p>
+          <a:p>
+            <a:pPr marL="0" marR="0" lvl="0" indent="0" algn="l" defTabSz="914400" rtl="0" eaLnBrk="1" fontAlgn="auto" latinLnBrk="0" hangingPunct="1">
+              <a:lnSpc>
+                <a:spcPct val="100000"/>
+              </a:lnSpc>
+              <a:spcBef>
+                <a:spcPts val="0"/>
+              </a:spcBef>
+              <a:spcAft>
+                <a:spcPts val="0"/>
+              </a:spcAft>
+              <a:buClrTx/>
+              <a:buSzTx/>
+              <a:buFontTx/>
+              <a:buNone/>
+              <a:tabLst/>
+              <a:defRPr/>
+            </a:pPr>
+            <a:r>
+              <a:rPr lang="en-US" sz="3600" dirty="0"/>
+              <a:t>Security — Does your product store or transmit sensitive information? Does your IT department require adherence to specific standards? What security best practices are used in your industry?</a:t>
+            </a:r>
+          </a:p>
+          <a:p>
+            <a:pPr marL="0" marR="0" lvl="0" indent="0" algn="l" defTabSz="914400" rtl="0" eaLnBrk="1" fontAlgn="auto" latinLnBrk="0" hangingPunct="1">
+              <a:lnSpc>
+                <a:spcPct val="100000"/>
+              </a:lnSpc>
+              <a:spcBef>
+                <a:spcPts val="0"/>
+              </a:spcBef>
+              <a:spcAft>
+                <a:spcPts val="0"/>
+              </a:spcAft>
+              <a:buClrTx/>
+              <a:buSzTx/>
+              <a:buFontTx/>
+              <a:buNone/>
+              <a:tabLst/>
+              <a:defRPr/>
+            </a:pPr>
+            <a:r>
+              <a:rPr lang="en-US" sz="3600" dirty="0"/>
+              <a:t>Capacity — What are your system’s storage requirements, today and in the future? How will your system scale up for increasing volume demands?</a:t>
+            </a:r>
+          </a:p>
+          <a:p>
+            <a:pPr marL="0" marR="0" lvl="0" indent="0" algn="l" defTabSz="914400" rtl="0" eaLnBrk="1" fontAlgn="auto" latinLnBrk="0" hangingPunct="1">
+              <a:lnSpc>
+                <a:spcPct val="100000"/>
+              </a:lnSpc>
+              <a:spcBef>
+                <a:spcPts val="0"/>
+              </a:spcBef>
+              <a:spcAft>
+                <a:spcPts val="0"/>
+              </a:spcAft>
+              <a:buClrTx/>
+              <a:buSzTx/>
+              <a:buFontTx/>
+              <a:buNone/>
+              <a:tabLst/>
+              <a:defRPr/>
+            </a:pPr>
+            <a:r>
+              <a:rPr lang="en-US" sz="3600" dirty="0"/>
+              <a:t>Compatibility — What are the minimum hardware requirements? What operating systems and their versions must be supported?</a:t>
+            </a:r>
+          </a:p>
+          <a:p>
+            <a:pPr marL="0" marR="0" lvl="0" indent="0" algn="l" defTabSz="914400" rtl="0" eaLnBrk="1" fontAlgn="auto" latinLnBrk="0" hangingPunct="1">
+              <a:lnSpc>
+                <a:spcPct val="100000"/>
+              </a:lnSpc>
+              <a:spcBef>
+                <a:spcPts val="0"/>
+              </a:spcBef>
+              <a:spcAft>
+                <a:spcPts val="0"/>
+              </a:spcAft>
+              <a:buClrTx/>
+              <a:buSzTx/>
+              <a:buFontTx/>
+              <a:buNone/>
+              <a:tabLst/>
+              <a:defRPr/>
+            </a:pPr>
+            <a:r>
+              <a:rPr lang="en-US" sz="3600" dirty="0"/>
+              <a:t>Reliability and Availability — What is the critical failure time under normal usage? Does a user need access to this all hours of every day?</a:t>
+            </a:r>
+          </a:p>
+          <a:p>
+            <a:pPr marL="0" marR="0" lvl="0" indent="0" algn="l" defTabSz="914400" rtl="0" eaLnBrk="1" fontAlgn="auto" latinLnBrk="0" hangingPunct="1">
+              <a:lnSpc>
+                <a:spcPct val="100000"/>
+              </a:lnSpc>
+              <a:spcBef>
+                <a:spcPts val="0"/>
+              </a:spcBef>
+              <a:spcAft>
+                <a:spcPts val="0"/>
+              </a:spcAft>
+              <a:buClrTx/>
+              <a:buSzTx/>
+              <a:buFontTx/>
+              <a:buNone/>
+              <a:tabLst/>
+              <a:defRPr/>
+            </a:pPr>
+            <a:r>
+              <a:rPr lang="en-US" sz="3600" dirty="0"/>
+              <a:t>Maintainability  + Manageability—How much time does it take to fix components, and how easily can an administrator manage the system? Under this umbrella, you could also define Recoverability and Serviceability.</a:t>
+            </a:r>
+          </a:p>
+          <a:p>
+            <a:pPr marL="0" marR="0" lvl="0" indent="0" algn="l" defTabSz="914400" rtl="0" eaLnBrk="1" fontAlgn="auto" latinLnBrk="0" hangingPunct="1">
+              <a:lnSpc>
+                <a:spcPct val="100000"/>
+              </a:lnSpc>
+              <a:spcBef>
+                <a:spcPts val="0"/>
+              </a:spcBef>
+              <a:spcAft>
+                <a:spcPts val="0"/>
+              </a:spcAft>
+              <a:buClrTx/>
+              <a:buSzTx/>
+              <a:buFontTx/>
+              <a:buNone/>
+              <a:tabLst/>
+              <a:defRPr/>
+            </a:pPr>
+            <a:r>
+              <a:rPr lang="en-US" sz="3600" dirty="0"/>
+              <a:t>Scalability – The Black Friday test. What are the highest workloads under which the system will still perform as expected?</a:t>
+            </a:r>
+          </a:p>
+          <a:p>
+            <a:pPr marL="0" marR="0" lvl="0" indent="0" algn="l" defTabSz="914400" rtl="0" eaLnBrk="1" fontAlgn="auto" latinLnBrk="0" hangingPunct="1">
+              <a:lnSpc>
+                <a:spcPct val="100000"/>
+              </a:lnSpc>
+              <a:spcBef>
+                <a:spcPts val="0"/>
+              </a:spcBef>
+              <a:spcAft>
+                <a:spcPts val="0"/>
+              </a:spcAft>
+              <a:buClrTx/>
+              <a:buSzTx/>
+              <a:buFontTx/>
+              <a:buNone/>
+              <a:tabLst/>
+              <a:defRPr/>
+            </a:pPr>
+            <a:r>
+              <a:rPr lang="en-US" sz="3600" dirty="0"/>
+              <a:t>Usability — How easy is it to use the product? What defines the experience of using the product?</a:t>
+            </a:r>
           </a:p>
         </p:txBody>
       </p:sp>
@@ -5029,7 +5072,7 @@
     </p:spTree>
     <p:extLst>
       <p:ext uri="{BB962C8B-B14F-4D97-AF65-F5344CB8AC3E}">
-        <p14:creationId xmlns:p14="http://schemas.microsoft.com/office/powerpoint/2010/main" val="346195192"/>
+        <p14:creationId xmlns:p14="http://schemas.microsoft.com/office/powerpoint/2010/main" val="3623387796"/>
       </p:ext>
     </p:extLst>
   </p:cSld>
@@ -6192,32 +6235,6 @@
             <a:r>
               <a:rPr lang="en-US" dirty="0"/>
               <a:t>This documentation can also serve as a point of reference for us to iterate with a customer, refining the requirements, and ensuring that all stakeholders agree on their completeness/correctness.</a:t>
-            </a:r>
-          </a:p>
-          <a:p>
-            <a:endParaRPr lang="en-US" dirty="0"/>
-          </a:p>
-          <a:p>
-            <a:pPr marL="0" marR="0" lvl="0" indent="0" algn="l" defTabSz="914400" rtl="0" eaLnBrk="1" fontAlgn="auto" latinLnBrk="0" hangingPunct="1">
-              <a:lnSpc>
-                <a:spcPct val="100000"/>
-              </a:lnSpc>
-              <a:spcBef>
-                <a:spcPts val="0"/>
-              </a:spcBef>
-              <a:spcAft>
-                <a:spcPts val="0"/>
-              </a:spcAft>
-              <a:buClrTx/>
-              <a:buSzTx/>
-              <a:buFontTx/>
-              <a:buNone/>
-              <a:tabLst/>
-              <a:defRPr/>
-            </a:pPr>
-            <a:r>
-              <a:rPr lang="en-US" dirty="0"/>
-              <a:t>There are a lot of options for how to do this…</a:t>
             </a:r>
           </a:p>
         </p:txBody>
@@ -6778,7 +6795,7 @@
           <a:p>
             <a:fld id="{5D2A64DE-480B-420F-9649-4F8E696E08E0}" type="datetime1">
               <a:rPr lang="en-US" smtClean="0"/>
-              <a:t>12/25/2022</a:t>
+              <a:t>1/11/2023</a:t>
             </a:fld>
             <a:endParaRPr lang="en-US"/>
           </a:p>
@@ -7102,7 +7119,7 @@
           <a:p>
             <a:fld id="{EA476A42-A091-4468-A075-64A31BE59948}" type="datetime1">
               <a:rPr lang="en-US" smtClean="0"/>
-              <a:t>12/25/2022</a:t>
+              <a:t>1/11/2023</a:t>
             </a:fld>
             <a:endParaRPr lang="en-US"/>
           </a:p>
@@ -7300,7 +7317,7 @@
           <a:p>
             <a:fld id="{0D3616D0-8311-4107-9726-6B805E7D05BA}" type="datetime1">
               <a:rPr lang="en-US" smtClean="0"/>
-              <a:t>12/25/2022</a:t>
+              <a:t>1/11/2023</a:t>
             </a:fld>
             <a:endParaRPr lang="en-US"/>
           </a:p>
@@ -7508,7 +7525,7 @@
           <a:p>
             <a:fld id="{3BC2557A-5C88-417A-A763-5AC779462A5F}" type="datetime1">
               <a:rPr lang="en-US" smtClean="0"/>
-              <a:t>12/25/2022</a:t>
+              <a:t>1/11/2023</a:t>
             </a:fld>
             <a:endParaRPr lang="en-US"/>
           </a:p>
@@ -8032,7 +8049,7 @@
           <a:p>
             <a:fld id="{07C7BFD4-467E-4EDE-93EA-052F5B39A4E5}" type="datetime1">
               <a:rPr lang="en-US" smtClean="0"/>
-              <a:t>12/25/2022</a:t>
+              <a:t>1/11/2023</a:t>
             </a:fld>
             <a:endParaRPr lang="en-US"/>
           </a:p>
@@ -8282,7 +8299,7 @@
           <a:p>
             <a:fld id="{07C7BFD4-467E-4EDE-93EA-052F5B39A4E5}" type="datetime1">
               <a:rPr lang="en-US" smtClean="0"/>
-              <a:t>12/25/2022</a:t>
+              <a:t>1/11/2023</a:t>
             </a:fld>
             <a:endParaRPr lang="en-US"/>
           </a:p>
@@ -8464,7 +8481,7 @@
           <a:p>
             <a:fld id="{109E55A0-C911-4F03-82FC-7E5926047D46}" type="datetime1">
               <a:rPr lang="en-US" smtClean="0"/>
-              <a:t>12/25/2022</a:t>
+              <a:t>1/11/2023</a:t>
             </a:fld>
             <a:endParaRPr lang="en-US"/>
           </a:p>
@@ -8777,7 +8794,7 @@
           <a:p>
             <a:fld id="{A533CBE2-D5BE-47AC-ADC2-9CDFC1D0CF90}" type="datetime1">
               <a:rPr lang="en-US" smtClean="0"/>
-              <a:t>12/25/2022</a:t>
+              <a:t>1/11/2023</a:t>
             </a:fld>
             <a:endParaRPr lang="en-US"/>
           </a:p>
@@ -9078,7 +9095,7 @@
           <a:p>
             <a:fld id="{39B7EDB1-CE74-4951-85A2-0B01C2128E28}" type="datetime1">
               <a:rPr lang="en-US" smtClean="0"/>
-              <a:t>12/25/2022</a:t>
+              <a:t>1/11/2023</a:t>
             </a:fld>
             <a:endParaRPr lang="en-US"/>
           </a:p>
@@ -9526,7 +9543,7 @@
           <a:p>
             <a:fld id="{2BC7EB92-A5C2-4807-A9DC-9EDE6CBFB241}" type="datetime1">
               <a:rPr lang="en-US" smtClean="0"/>
-              <a:t>12/25/2022</a:t>
+              <a:t>1/11/2023</a:t>
             </a:fld>
             <a:endParaRPr lang="en-US"/>
           </a:p>
@@ -9639,7 +9656,7 @@
           <a:p>
             <a:fld id="{2B7B7EE0-7771-4CD5-9B2B-3550753A54A1}" type="datetime1">
               <a:rPr lang="en-US" smtClean="0"/>
-              <a:t>12/25/2022</a:t>
+              <a:t>1/11/2023</a:t>
             </a:fld>
             <a:endParaRPr lang="en-US"/>
           </a:p>
@@ -9950,7 +9967,7 @@
           <a:p>
             <a:fld id="{F8B318B3-0E87-4416-A9B8-D891968C2727}" type="datetime1">
               <a:rPr lang="en-US" smtClean="0"/>
-              <a:t>12/25/2022</a:t>
+              <a:t>1/11/2023</a:t>
             </a:fld>
             <a:endParaRPr lang="en-US"/>
           </a:p>
@@ -10191,7 +10208,7 @@
           <a:p>
             <a:fld id="{54D997E8-DDEE-43F1-8D9B-F8A1E11DE488}" type="datetime1">
               <a:rPr lang="en-US" smtClean="0"/>
-              <a:t>12/25/2022</a:t>
+              <a:t>1/11/2023</a:t>
             </a:fld>
             <a:endParaRPr lang="en-US"/>
           </a:p>
@@ -12497,6 +12514,225 @@
           <p:cNvPr id="2" name="Title 1">
             <a:extLst>
               <a:ext uri="{FF2B5EF4-FFF2-40B4-BE49-F238E27FC236}">
+                <a16:creationId xmlns:a16="http://schemas.microsoft.com/office/drawing/2014/main" id="{16F86D58-152F-496B-BA81-FDA5B100832A}"/>
+              </a:ext>
+            </a:extLst>
+          </p:cNvPr>
+          <p:cNvSpPr>
+            <a:spLocks noGrp="1"/>
+          </p:cNvSpPr>
+          <p:nvPr>
+            <p:ph type="title"/>
+          </p:nvPr>
+        </p:nvSpPr>
+        <p:spPr/>
+        <p:txBody>
+          <a:bodyPr/>
+          <a:lstStyle/>
+          <a:p>
+            <a:r>
+              <a:rPr lang="en-US" dirty="0"/>
+              <a:t>Requirements: Which to pick?</a:t>
+            </a:r>
+          </a:p>
+        </p:txBody>
+      </p:sp>
+      <p:sp>
+        <p:nvSpPr>
+          <p:cNvPr id="4" name="Slide Number Placeholder 3">
+            <a:extLst>
+              <a:ext uri="{FF2B5EF4-FFF2-40B4-BE49-F238E27FC236}">
+                <a16:creationId xmlns:a16="http://schemas.microsoft.com/office/drawing/2014/main" id="{C7C3DEB3-F948-4B7E-8BDA-FB7ABCF7A993}"/>
+              </a:ext>
+            </a:extLst>
+          </p:cNvPr>
+          <p:cNvSpPr>
+            <a:spLocks noGrp="1"/>
+          </p:cNvSpPr>
+          <p:nvPr>
+            <p:ph type="sldNum" sz="quarter" idx="12"/>
+          </p:nvPr>
+        </p:nvSpPr>
+        <p:spPr/>
+        <p:txBody>
+          <a:bodyPr/>
+          <a:lstStyle/>
+          <a:p>
+            <a:fld id="{20F37917-FD3A-4669-9018-DA04BCDD3D75}" type="slidenum">
+              <a:rPr lang="en-US" smtClean="0"/>
+              <a:t>15</a:t>
+            </a:fld>
+            <a:endParaRPr lang="en-US"/>
+          </a:p>
+        </p:txBody>
+      </p:sp>
+      <p:sp>
+        <p:nvSpPr>
+          <p:cNvPr id="7" name="Content Placeholder 6">
+            <a:extLst>
+              <a:ext uri="{FF2B5EF4-FFF2-40B4-BE49-F238E27FC236}">
+                <a16:creationId xmlns:a16="http://schemas.microsoft.com/office/drawing/2014/main" id="{695B468C-8A4C-334E-9ECE-6E4EE06EEA36}"/>
+              </a:ext>
+            </a:extLst>
+          </p:cNvPr>
+          <p:cNvSpPr>
+            <a:spLocks noGrp="1"/>
+          </p:cNvSpPr>
+          <p:nvPr>
+            <p:ph idx="1"/>
+          </p:nvPr>
+        </p:nvSpPr>
+        <p:spPr>
+          <a:xfrm>
+            <a:off x="838200" y="1500160"/>
+            <a:ext cx="10515600" cy="4351338"/>
+          </a:xfrm>
+        </p:spPr>
+        <p:txBody>
+          <a:bodyPr/>
+          <a:lstStyle/>
+          <a:p>
+            <a:r>
+              <a:rPr lang="en-US" dirty="0"/>
+              <a:t>There are four knobs you can adjust when negotiating requirements:</a:t>
+            </a:r>
+          </a:p>
+          <a:p>
+            <a:pPr lvl="1"/>
+            <a:r>
+              <a:rPr lang="en-US" dirty="0"/>
+              <a:t>Project scope</a:t>
+            </a:r>
+          </a:p>
+          <a:p>
+            <a:pPr lvl="1"/>
+            <a:r>
+              <a:rPr lang="en-US" dirty="0"/>
+              <a:t>Project duration</a:t>
+            </a:r>
+          </a:p>
+          <a:p>
+            <a:pPr lvl="1"/>
+            <a:r>
+              <a:rPr lang="en-US" dirty="0"/>
+              <a:t>Project quality</a:t>
+            </a:r>
+          </a:p>
+          <a:p>
+            <a:pPr lvl="1"/>
+            <a:r>
+              <a:rPr lang="en-US" dirty="0"/>
+              <a:t>Project cost</a:t>
+            </a:r>
+          </a:p>
+          <a:p>
+            <a:r>
+              <a:rPr lang="en-US" dirty="0"/>
+              <a:t>Usually cost is most constrained: you have a budget to spend, and you have a headcount of developers to pay</a:t>
+            </a:r>
+          </a:p>
+          <a:p>
+            <a:r>
+              <a:rPr lang="en-US" dirty="0"/>
+              <a:t>Determining feasible scope, timeline and maximizing quality is the subject of much software engineering research, see next lesson</a:t>
+            </a:r>
+          </a:p>
+        </p:txBody>
+      </p:sp>
+      <p:sp>
+        <p:nvSpPr>
+          <p:cNvPr id="8" name="TextBox 7">
+            <a:extLst>
+              <a:ext uri="{FF2B5EF4-FFF2-40B4-BE49-F238E27FC236}">
+                <a16:creationId xmlns:a16="http://schemas.microsoft.com/office/drawing/2014/main" id="{F62F96CF-020C-774F-947B-42E422E24849}"/>
+              </a:ext>
+            </a:extLst>
+          </p:cNvPr>
+          <p:cNvSpPr txBox="1"/>
+          <p:nvPr/>
+        </p:nvSpPr>
+        <p:spPr>
+          <a:xfrm>
+            <a:off x="3683000" y="2641600"/>
+            <a:ext cx="0" cy="0"/>
+          </a:xfrm>
+          <a:prstGeom prst="rect">
+            <a:avLst/>
+          </a:prstGeom>
+          <a:noFill/>
+          <a:ln>
+            <a:noFill/>
+          </a:ln>
+        </p:spPr>
+        <p:style>
+          <a:lnRef idx="2">
+            <a:schemeClr val="accent1">
+              <a:shade val="50000"/>
+            </a:schemeClr>
+          </a:lnRef>
+          <a:fillRef idx="1">
+            <a:schemeClr val="accent1"/>
+          </a:fillRef>
+          <a:effectRef idx="0">
+            <a:schemeClr val="accent1"/>
+          </a:effectRef>
+          <a:fontRef idx="minor">
+            <a:schemeClr val="lt1"/>
+          </a:fontRef>
+        </p:style>
+        <p:txBody>
+          <a:bodyPr rot="0" spcFirstLastPara="0" vertOverflow="overflow" horzOverflow="overflow" vert="horz" wrap="none" lIns="91440" tIns="45720" rIns="91440" bIns="45720" numCol="1" spcCol="0" rtlCol="0" fromWordArt="0" anchor="ctr" anchorCtr="0" forceAA="0" compatLnSpc="1">
+            <a:prstTxWarp prst="textNoShape">
+              <a:avLst/>
+            </a:prstTxWarp>
+            <a:noAutofit/>
+          </a:bodyPr>
+          <a:lstStyle/>
+          <a:p>
+            <a:pPr algn="l"/>
+            <a:endParaRPr lang="en-US" dirty="0">
+              <a:solidFill>
+                <a:schemeClr val="tx1"/>
+              </a:solidFill>
+            </a:endParaRPr>
+          </a:p>
+        </p:txBody>
+      </p:sp>
+    </p:spTree>
+    <p:extLst>
+      <p:ext uri="{BB962C8B-B14F-4D97-AF65-F5344CB8AC3E}">
+        <p14:creationId xmlns:p14="http://schemas.microsoft.com/office/powerpoint/2010/main" val="537342029"/>
+      </p:ext>
+    </p:extLst>
+  </p:cSld>
+  <p:clrMapOvr>
+    <a:masterClrMapping/>
+  </p:clrMapOvr>
+</p:sld>
+</file>
+
+<file path=ppt/slides/slide16.xml><?xml version="1.0" encoding="utf-8"?>
+<p:sld xmlns:a="http://schemas.openxmlformats.org/drawingml/2006/main" xmlns:r="http://schemas.openxmlformats.org/officeDocument/2006/relationships" xmlns:p="http://schemas.openxmlformats.org/presentationml/2006/main">
+  <p:cSld>
+    <p:spTree>
+      <p:nvGrpSpPr>
+        <p:cNvPr id="1" name=""/>
+        <p:cNvGrpSpPr/>
+        <p:nvPr/>
+      </p:nvGrpSpPr>
+      <p:grpSpPr>
+        <a:xfrm>
+          <a:off x="0" y="0"/>
+          <a:ext cx="0" cy="0"/>
+          <a:chOff x="0" y="0"/>
+          <a:chExt cx="0" cy="0"/>
+        </a:xfrm>
+      </p:grpSpPr>
+      <p:sp>
+        <p:nvSpPr>
+          <p:cNvPr id="2" name="Title 1">
+            <a:extLst>
+              <a:ext uri="{FF2B5EF4-FFF2-40B4-BE49-F238E27FC236}">
                 <a16:creationId xmlns:a16="http://schemas.microsoft.com/office/drawing/2014/main" id="{F23E412C-C21C-9A47-9132-9BC666325FD4}"/>
               </a:ext>
             </a:extLst>
@@ -12615,7 +12851,7 @@
           <a:p>
             <a:fld id="{20F37917-FD3A-4669-9018-DA04BCDD3D75}" type="slidenum">
               <a:rPr lang="en-US" smtClean="0"/>
-              <a:t>15</a:t>
+              <a:t>16</a:t>
             </a:fld>
             <a:endParaRPr lang="en-US"/>
           </a:p>
@@ -12849,166 +13085,6 @@
 </p:sld>
 </file>
 
-<file path=ppt/slides/slide16.xml><?xml version="1.0" encoding="utf-8"?>
-<p:sld xmlns:a="http://schemas.openxmlformats.org/drawingml/2006/main" xmlns:r="http://schemas.openxmlformats.org/officeDocument/2006/relationships" xmlns:p="http://schemas.openxmlformats.org/presentationml/2006/main">
-  <p:cSld>
-    <p:spTree>
-      <p:nvGrpSpPr>
-        <p:cNvPr id="1" name=""/>
-        <p:cNvGrpSpPr/>
-        <p:nvPr/>
-      </p:nvGrpSpPr>
-      <p:grpSpPr>
-        <a:xfrm>
-          <a:off x="0" y="0"/>
-          <a:ext cx="0" cy="0"/>
-          <a:chOff x="0" y="0"/>
-          <a:chExt cx="0" cy="0"/>
-        </a:xfrm>
-      </p:grpSpPr>
-      <p:sp>
-        <p:nvSpPr>
-          <p:cNvPr id="2" name="Title 1">
-            <a:extLst>
-              <a:ext uri="{FF2B5EF4-FFF2-40B4-BE49-F238E27FC236}">
-                <a16:creationId xmlns:a16="http://schemas.microsoft.com/office/drawing/2014/main" id="{16F86D58-152F-496B-BA81-FDA5B100832A}"/>
-              </a:ext>
-            </a:extLst>
-          </p:cNvPr>
-          <p:cNvSpPr>
-            <a:spLocks noGrp="1"/>
-          </p:cNvSpPr>
-          <p:nvPr>
-            <p:ph type="title"/>
-          </p:nvPr>
-        </p:nvSpPr>
-        <p:spPr/>
-        <p:txBody>
-          <a:bodyPr/>
-          <a:lstStyle/>
-          <a:p>
-            <a:r>
-              <a:rPr lang="en-US" dirty="0"/>
-              <a:t>Non-Functional Requirements:</a:t>
-            </a:r>
-          </a:p>
-        </p:txBody>
-      </p:sp>
-      <p:sp>
-        <p:nvSpPr>
-          <p:cNvPr id="4" name="Slide Number Placeholder 3">
-            <a:extLst>
-              <a:ext uri="{FF2B5EF4-FFF2-40B4-BE49-F238E27FC236}">
-                <a16:creationId xmlns:a16="http://schemas.microsoft.com/office/drawing/2014/main" id="{C7C3DEB3-F948-4B7E-8BDA-FB7ABCF7A993}"/>
-              </a:ext>
-            </a:extLst>
-          </p:cNvPr>
-          <p:cNvSpPr>
-            <a:spLocks noGrp="1"/>
-          </p:cNvSpPr>
-          <p:nvPr>
-            <p:ph type="sldNum" sz="quarter" idx="12"/>
-          </p:nvPr>
-        </p:nvSpPr>
-        <p:spPr/>
-        <p:txBody>
-          <a:bodyPr/>
-          <a:lstStyle/>
-          <a:p>
-            <a:fld id="{20F37917-FD3A-4669-9018-DA04BCDD3D75}" type="slidenum">
-              <a:rPr lang="en-US" smtClean="0"/>
-              <a:t>16</a:t>
-            </a:fld>
-            <a:endParaRPr lang="en-US"/>
-          </a:p>
-        </p:txBody>
-      </p:sp>
-      <p:sp>
-        <p:nvSpPr>
-          <p:cNvPr id="9" name="Content Placeholder 2">
-            <a:extLst>
-              <a:ext uri="{FF2B5EF4-FFF2-40B4-BE49-F238E27FC236}">
-                <a16:creationId xmlns:a16="http://schemas.microsoft.com/office/drawing/2014/main" id="{154B344C-9133-E9C8-0056-74943F854D75}"/>
-              </a:ext>
-            </a:extLst>
-          </p:cNvPr>
-          <p:cNvSpPr>
-            <a:spLocks noGrp="1"/>
-          </p:cNvSpPr>
-          <p:nvPr>
-            <p:ph idx="1"/>
-          </p:nvPr>
-        </p:nvSpPr>
-        <p:spPr>
-          <a:xfrm>
-            <a:off x="838200" y="1500188"/>
-            <a:ext cx="9521142" cy="4351337"/>
-          </a:xfrm>
-        </p:spPr>
-        <p:txBody>
-          <a:bodyPr/>
-          <a:lstStyle/>
-          <a:p>
-            <a:r>
-              <a:rPr lang="en-US" dirty="0"/>
-              <a:t>What other properties might a customer want to know about </a:t>
-            </a:r>
-            <a:r>
-              <a:rPr lang="en-US"/>
-              <a:t>the product?</a:t>
-            </a:r>
-            <a:endParaRPr lang="en-US" dirty="0"/>
-          </a:p>
-          <a:p>
-            <a:pPr lvl="1"/>
-            <a:r>
-              <a:rPr lang="en-US" dirty="0"/>
-              <a:t>How quickly can a transcript be retrieval? (Performance)</a:t>
-            </a:r>
-          </a:p>
-          <a:p>
-            <a:pPr lvl="1"/>
-            <a:r>
-              <a:rPr lang="en-US" dirty="0"/>
-              <a:t>How many student transcripts can our system store? (Scalability)</a:t>
-            </a:r>
-          </a:p>
-          <a:p>
-            <a:pPr lvl="1"/>
-            <a:r>
-              <a:rPr lang="en-US" dirty="0"/>
-              <a:t>How long did I spend on the phone with support to set up the software? (Usability)</a:t>
-            </a:r>
-          </a:p>
-          <a:p>
-            <a:pPr lvl="1"/>
-            <a:r>
-              <a:rPr lang="en-US" dirty="0"/>
-              <a:t>After my system is setup, is the access controlled at all? (Security)</a:t>
-            </a:r>
-          </a:p>
-          <a:p>
-            <a:pPr lvl="1"/>
-            <a:r>
-              <a:rPr lang="en-US" dirty="0"/>
-              <a:t>Are these any times when I can’t use this system? (Availability) </a:t>
-            </a:r>
-          </a:p>
-        </p:txBody>
-      </p:sp>
-    </p:spTree>
-    <p:extLst>
-      <p:ext uri="{BB962C8B-B14F-4D97-AF65-F5344CB8AC3E}">
-        <p14:creationId xmlns:p14="http://schemas.microsoft.com/office/powerpoint/2010/main" val="3635116464"/>
-      </p:ext>
-    </p:extLst>
-  </p:cSld>
-  <p:clrMapOvr>
-    <a:masterClrMapping/>
-  </p:clrMapOvr>
-</p:sld>
-</file>
-
 <file path=ppt/slides/slide17.xml><?xml version="1.0" encoding="utf-8"?>
 <p:sld xmlns:a="http://schemas.openxmlformats.org/drawingml/2006/main" xmlns:r="http://schemas.openxmlformats.org/officeDocument/2006/relationships" xmlns:p="http://schemas.openxmlformats.org/presentationml/2006/main">
   <p:cSld>
@@ -13049,7 +13125,7 @@
           <a:p>
             <a:r>
               <a:rPr lang="en-US" dirty="0"/>
-              <a:t>Requirements: Which to pick?</a:t>
+              <a:t>Non-Functional Requirements:</a:t>
             </a:r>
           </a:p>
         </p:txBody>
@@ -13085,10 +13161,10 @@
       </p:sp>
       <p:sp>
         <p:nvSpPr>
-          <p:cNvPr id="7" name="Content Placeholder 6">
+          <p:cNvPr id="9" name="Content Placeholder 2">
             <a:extLst>
               <a:ext uri="{FF2B5EF4-FFF2-40B4-BE49-F238E27FC236}">
-                <a16:creationId xmlns:a16="http://schemas.microsoft.com/office/drawing/2014/main" id="{695B468C-8A4C-334E-9ECE-6E4EE06EEA36}"/>
+                <a16:creationId xmlns:a16="http://schemas.microsoft.com/office/drawing/2014/main" id="{154B344C-9133-E9C8-0056-74943F854D75}"/>
               </a:ext>
             </a:extLst>
           </p:cNvPr>
@@ -13101,8 +13177,8 @@
         </p:nvSpPr>
         <p:spPr>
           <a:xfrm>
-            <a:off x="838200" y="1500160"/>
-            <a:ext cx="10515600" cy="4351338"/>
+            <a:off x="838200" y="1500188"/>
+            <a:ext cx="9521142" cy="4351337"/>
           </a:xfrm>
         </p:spPr>
         <p:txBody>
@@ -13111,114 +13187,55 @@
           <a:p>
             <a:r>
               <a:rPr lang="en-US" dirty="0"/>
-              <a:t>There are four knobs you can adjust when negotiating requirements:</a:t>
-            </a:r>
+              <a:t>What other properties might a customer want to know about </a:t>
+            </a:r>
+            <a:r>
+              <a:rPr lang="en-US"/>
+              <a:t>the product?</a:t>
+            </a:r>
+            <a:endParaRPr lang="en-US" dirty="0"/>
           </a:p>
           <a:p>
             <a:pPr lvl="1"/>
             <a:r>
               <a:rPr lang="en-US" dirty="0"/>
-              <a:t>Project scope</a:t>
+              <a:t>How quickly can a transcript be retrieval? (Performance)</a:t>
             </a:r>
           </a:p>
           <a:p>
             <a:pPr lvl="1"/>
             <a:r>
               <a:rPr lang="en-US" dirty="0"/>
-              <a:t>Project duration</a:t>
+              <a:t>How many student transcripts can our system store? (Scalability)</a:t>
             </a:r>
           </a:p>
           <a:p>
             <a:pPr lvl="1"/>
             <a:r>
               <a:rPr lang="en-US" dirty="0"/>
-              <a:t>Project quality</a:t>
+              <a:t>How long did I spend on the phone with support to set up the software? (Usability)</a:t>
             </a:r>
           </a:p>
           <a:p>
             <a:pPr lvl="1"/>
             <a:r>
               <a:rPr lang="en-US" dirty="0"/>
-              <a:t>Project cost</a:t>
-            </a:r>
-          </a:p>
-          <a:p>
+              <a:t>After my system is setup, is the access controlled at all? (Security)</a:t>
+            </a:r>
+          </a:p>
+          <a:p>
+            <a:pPr lvl="1"/>
             <a:r>
               <a:rPr lang="en-US" dirty="0"/>
-              <a:t>Usually cost is most constrained: you have a budget to spend, and you have a headcount of developers to pay</a:t>
-            </a:r>
-          </a:p>
-          <a:p>
-            <a:r>
-              <a:rPr lang="en-US" dirty="0"/>
-              <a:t>Determining feasible scope, timeline and maximizing quality is the subject of much software engineering research, see next lesson</a:t>
-            </a:r>
-          </a:p>
-        </p:txBody>
-      </p:sp>
-      <p:sp>
-        <p:nvSpPr>
-          <p:cNvPr id="8" name="TextBox 7">
-            <a:extLst>
-              <a:ext uri="{FF2B5EF4-FFF2-40B4-BE49-F238E27FC236}">
-                <a16:creationId xmlns:a16="http://schemas.microsoft.com/office/drawing/2014/main" id="{F62F96CF-020C-774F-947B-42E422E24849}"/>
-              </a:ext>
-            </a:extLst>
-          </p:cNvPr>
-          <p:cNvSpPr txBox="1"/>
-          <p:nvPr/>
-        </p:nvSpPr>
-        <p:spPr>
-          <a:xfrm>
-            <a:off x="3683000" y="2641600"/>
-            <a:ext cx="0" cy="0"/>
-          </a:xfrm>
-          <a:prstGeom prst="rect">
-            <a:avLst/>
-          </a:prstGeom>
-          <a:noFill/>
-          <a:ln>
-            <a:noFill/>
-          </a:ln>
-        </p:spPr>
-        <p:style>
-          <a:lnRef idx="2">
-            <a:schemeClr val="accent1">
-              <a:shade val="50000"/>
-            </a:schemeClr>
-          </a:lnRef>
-          <a:fillRef idx="1">
-            <a:schemeClr val="accent1"/>
-          </a:fillRef>
-          <a:effectRef idx="0">
-            <a:schemeClr val="accent1"/>
-          </a:effectRef>
-          <a:fontRef idx="minor">
-            <a:schemeClr val="lt1"/>
-          </a:fontRef>
-        </p:style>
-        <p:txBody>
-          <a:bodyPr rot="0" spcFirstLastPara="0" vertOverflow="overflow" horzOverflow="overflow" vert="horz" wrap="none" lIns="91440" tIns="45720" rIns="91440" bIns="45720" numCol="1" spcCol="0" rtlCol="0" fromWordArt="0" anchor="ctr" anchorCtr="0" forceAA="0" compatLnSpc="1">
-            <a:prstTxWarp prst="textNoShape">
-              <a:avLst/>
-            </a:prstTxWarp>
-            <a:noAutofit/>
-          </a:bodyPr>
-          <a:lstStyle/>
-          <a:p>
-            <a:pPr algn="l"/>
-            <a:endParaRPr lang="en-US" dirty="0">
-              <a:solidFill>
-                <a:schemeClr val="tx1"/>
-              </a:solidFill>
-            </a:endParaRPr>
+              <a:t>Are these any times when I can’t use this system? (Availability) </a:t>
+            </a:r>
           </a:p>
         </p:txBody>
       </p:sp>
     </p:spTree>
     <p:extLst>
       <p:ext uri="{BB962C8B-B14F-4D97-AF65-F5344CB8AC3E}">
-        <p14:creationId xmlns:p14="http://schemas.microsoft.com/office/powerpoint/2010/main" val="537342029"/>
+        <p14:creationId xmlns:p14="http://schemas.microsoft.com/office/powerpoint/2010/main" val="3635116464"/>
       </p:ext>
     </p:extLst>
   </p:cSld>

</xml_diff>